<commit_message>
Fixed back-button, added final presentation
</commit_message>
<xml_diff>
--- a/presentation/iRail.pptx
+++ b/presentation/iRail.pptx
@@ -303,7 +303,7 @@
           <a:p>
             <a:fld id="{E7C86848-63DA-2549-B754-8F8F7A5000F7}" type="datetimeFigureOut">
               <a:rPr lang="en-US" smtClean="0"/>
-              <a:t>16/07/13</a:t>
+              <a:t>17/07/13</a:t>
             </a:fld>
             <a:endParaRPr lang="en-US"/>
           </a:p>
@@ -473,7 +473,7 @@
           <a:p>
             <a:fld id="{E7C86848-63DA-2549-B754-8F8F7A5000F7}" type="datetimeFigureOut">
               <a:rPr lang="en-US" smtClean="0"/>
-              <a:t>16/07/13</a:t>
+              <a:t>17/07/13</a:t>
             </a:fld>
             <a:endParaRPr lang="en-US"/>
           </a:p>
@@ -653,7 +653,7 @@
           <a:p>
             <a:fld id="{E7C86848-63DA-2549-B754-8F8F7A5000F7}" type="datetimeFigureOut">
               <a:rPr lang="en-US" smtClean="0"/>
-              <a:t>16/07/13</a:t>
+              <a:t>17/07/13</a:t>
             </a:fld>
             <a:endParaRPr lang="en-US"/>
           </a:p>
@@ -823,7 +823,7 @@
           <a:p>
             <a:fld id="{E7C86848-63DA-2549-B754-8F8F7A5000F7}" type="datetimeFigureOut">
               <a:rPr lang="en-US" smtClean="0"/>
-              <a:t>16/07/13</a:t>
+              <a:t>17/07/13</a:t>
             </a:fld>
             <a:endParaRPr lang="en-US"/>
           </a:p>
@@ -1069,7 +1069,7 @@
           <a:p>
             <a:fld id="{E7C86848-63DA-2549-B754-8F8F7A5000F7}" type="datetimeFigureOut">
               <a:rPr lang="en-US" smtClean="0"/>
-              <a:t>16/07/13</a:t>
+              <a:t>17/07/13</a:t>
             </a:fld>
             <a:endParaRPr lang="en-US"/>
           </a:p>
@@ -1357,7 +1357,7 @@
           <a:p>
             <a:fld id="{E7C86848-63DA-2549-B754-8F8F7A5000F7}" type="datetimeFigureOut">
               <a:rPr lang="en-US" smtClean="0"/>
-              <a:t>16/07/13</a:t>
+              <a:t>17/07/13</a:t>
             </a:fld>
             <a:endParaRPr lang="en-US"/>
           </a:p>
@@ -1784,7 +1784,7 @@
           <a:p>
             <a:fld id="{E7C86848-63DA-2549-B754-8F8F7A5000F7}" type="datetimeFigureOut">
               <a:rPr lang="en-US" smtClean="0"/>
-              <a:t>16/07/13</a:t>
+              <a:t>17/07/13</a:t>
             </a:fld>
             <a:endParaRPr lang="en-US"/>
           </a:p>
@@ -1902,7 +1902,7 @@
           <a:p>
             <a:fld id="{E7C86848-63DA-2549-B754-8F8F7A5000F7}" type="datetimeFigureOut">
               <a:rPr lang="en-US" smtClean="0"/>
-              <a:t>16/07/13</a:t>
+              <a:t>17/07/13</a:t>
             </a:fld>
             <a:endParaRPr lang="en-US"/>
           </a:p>
@@ -1997,7 +1997,7 @@
           <a:p>
             <a:fld id="{E7C86848-63DA-2549-B754-8F8F7A5000F7}" type="datetimeFigureOut">
               <a:rPr lang="en-US" smtClean="0"/>
-              <a:t>16/07/13</a:t>
+              <a:t>17/07/13</a:t>
             </a:fld>
             <a:endParaRPr lang="en-US"/>
           </a:p>
@@ -2274,7 +2274,7 @@
           <a:p>
             <a:fld id="{E7C86848-63DA-2549-B754-8F8F7A5000F7}" type="datetimeFigureOut">
               <a:rPr lang="en-US" smtClean="0"/>
-              <a:t>16/07/13</a:t>
+              <a:t>17/07/13</a:t>
             </a:fld>
             <a:endParaRPr lang="en-US"/>
           </a:p>
@@ -2527,7 +2527,7 @@
           <a:p>
             <a:fld id="{E7C86848-63DA-2549-B754-8F8F7A5000F7}" type="datetimeFigureOut">
               <a:rPr lang="en-US" smtClean="0"/>
-              <a:t>16/07/13</a:t>
+              <a:t>17/07/13</a:t>
             </a:fld>
             <a:endParaRPr lang="en-US"/>
           </a:p>
@@ -2745,7 +2745,7 @@
           <a:p>
             <a:fld id="{E7C86848-63DA-2549-B754-8F8F7A5000F7}" type="datetimeFigureOut">
               <a:rPr lang="en-US" smtClean="0"/>
-              <a:t>16/07/13</a:t>
+              <a:t>17/07/13</a:t>
             </a:fld>
             <a:endParaRPr lang="en-US"/>
           </a:p>

</xml_diff>